<commit_message>
How to program a DFA in C examples
</commit_message>
<xml_diff>
--- a/pa3-prep.pptx
+++ b/pa3-prep.pptx
@@ -237,7 +237,7 @@
               <a:rPr lang="en-US" smtClean="0">
                 <a:latin typeface="Arial Regular"/>
               </a:rPr>
-              <a:t>4/5/24</a:t>
+              <a:t>4/8/24</a:t>
             </a:fld>
             <a:endParaRPr lang="en-US">
               <a:latin typeface="Arial Regular"/>
@@ -428,7 +428,7 @@
             <a:fld id="{C7103FDF-5845-2441-8890-D723FF5A85D0}" type="datetimeFigureOut">
               <a:rPr lang="en-US" smtClean="0"/>
               <a:pPr/>
-              <a:t>4/5/24</a:t>
+              <a:t>4/8/24</a:t>
             </a:fld>
             <a:endParaRPr lang="en-US"/>
           </a:p>
@@ -12935,28 +12935,6 @@
               </a:rPr>
               <a:t>Wextra</a:t>
             </a:r>
-            <a:r>
-              <a:rPr lang="en-US" sz="1200" dirty="0">
-                <a:solidFill>
-                  <a:srgbClr val="000000"/>
-                </a:solidFill>
-                <a:effectLst/>
-                <a:latin typeface="Consolas" panose="020B0609020204030204" pitchFamily="49" charset="0"/>
-                <a:cs typeface="Consolas" panose="020B0609020204030204" pitchFamily="49" charset="0"/>
-              </a:rPr>
-              <a:t> -</a:t>
-            </a:r>
-            <a:r>
-              <a:rPr lang="en-US" sz="1200" dirty="0" err="1">
-                <a:solidFill>
-                  <a:srgbClr val="000000"/>
-                </a:solidFill>
-                <a:effectLst/>
-                <a:latin typeface="Consolas" panose="020B0609020204030204" pitchFamily="49" charset="0"/>
-                <a:cs typeface="Consolas" panose="020B0609020204030204" pitchFamily="49" charset="0"/>
-              </a:rPr>
-              <a:t>Werror</a:t>
-            </a:r>
             <a:endParaRPr lang="en-US" sz="1200" dirty="0">
               <a:solidFill>
                 <a:srgbClr val="000000"/>
@@ -13326,7 +13304,7 @@
         <p:spPr>
           <a:xfrm>
             <a:off x="1551249" y="531779"/>
-            <a:ext cx="6445995" cy="5909310"/>
+            <a:ext cx="5849678" cy="5909310"/>
           </a:xfrm>
           <a:prstGeom prst="rect">
             <a:avLst/>
@@ -13429,27 +13407,7 @@
                 <a:latin typeface="Consolas" panose="020B0609020204030204" pitchFamily="49" charset="0"/>
                 <a:cs typeface="Consolas" panose="020B0609020204030204" pitchFamily="49" charset="0"/>
               </a:rPr>
-              <a:t> -</a:t>
-            </a:r>
-            <a:r>
-              <a:rPr lang="en-US" sz="1400" dirty="0" err="1">
-                <a:solidFill>
-                  <a:srgbClr val="0070C0"/>
-                </a:solidFill>
-                <a:latin typeface="Consolas" panose="020B0609020204030204" pitchFamily="49" charset="0"/>
-                <a:cs typeface="Consolas" panose="020B0609020204030204" pitchFamily="49" charset="0"/>
-              </a:rPr>
-              <a:t>Werror</a:t>
-            </a:r>
-            <a:r>
-              <a:rPr lang="en-US" sz="1400" dirty="0">
-                <a:solidFill>
-                  <a:srgbClr val="0070C0"/>
-                </a:solidFill>
-                <a:latin typeface="Consolas" panose="020B0609020204030204" pitchFamily="49" charset="0"/>
-                <a:cs typeface="Consolas" panose="020B0609020204030204" pitchFamily="49" charset="0"/>
-              </a:rPr>
-              <a:t>     -c -o </a:t>
+              <a:t>    -c -o </a:t>
             </a:r>
             <a:r>
               <a:rPr lang="en-US" sz="1400" dirty="0" err="1">
@@ -13548,26 +13506,6 @@
                 <a:latin typeface="Consolas" panose="020B0609020204030204" pitchFamily="49" charset="0"/>
                 <a:cs typeface="Consolas" panose="020B0609020204030204" pitchFamily="49" charset="0"/>
               </a:rPr>
-              <a:t> -</a:t>
-            </a:r>
-            <a:r>
-              <a:rPr lang="en-US" sz="1400" dirty="0" err="1">
-                <a:solidFill>
-                  <a:srgbClr val="0070C0"/>
-                </a:solidFill>
-                <a:latin typeface="Consolas" panose="020B0609020204030204" pitchFamily="49" charset="0"/>
-                <a:cs typeface="Consolas" panose="020B0609020204030204" pitchFamily="49" charset="0"/>
-              </a:rPr>
-              <a:t>Werror</a:t>
-            </a:r>
-            <a:r>
-              <a:rPr lang="en-US" sz="1400" dirty="0">
-                <a:solidFill>
-                  <a:srgbClr val="0070C0"/>
-                </a:solidFill>
-                <a:latin typeface="Consolas" panose="020B0609020204030204" pitchFamily="49" charset="0"/>
-                <a:cs typeface="Consolas" panose="020B0609020204030204" pitchFamily="49" charset="0"/>
-              </a:rPr>
               <a:t>     -c -o </a:t>
             </a:r>
             <a:r>
@@ -13658,26 +13596,6 @@
                 <a:cs typeface="Consolas" panose="020B0609020204030204" pitchFamily="49" charset="0"/>
               </a:rPr>
               <a:t>Wextra</a:t>
-            </a:r>
-            <a:r>
-              <a:rPr lang="en-US" sz="1400" dirty="0">
-                <a:solidFill>
-                  <a:srgbClr val="0070C0"/>
-                </a:solidFill>
-                <a:latin typeface="Consolas" panose="020B0609020204030204" pitchFamily="49" charset="0"/>
-                <a:cs typeface="Consolas" panose="020B0609020204030204" pitchFamily="49" charset="0"/>
-              </a:rPr>
-              <a:t> -</a:t>
-            </a:r>
-            <a:r>
-              <a:rPr lang="en-US" sz="1400" dirty="0" err="1">
-                <a:solidFill>
-                  <a:srgbClr val="0070C0"/>
-                </a:solidFill>
-                <a:latin typeface="Consolas" panose="020B0609020204030204" pitchFamily="49" charset="0"/>
-                <a:cs typeface="Consolas" panose="020B0609020204030204" pitchFamily="49" charset="0"/>
-              </a:rPr>
-              <a:t>Werror</a:t>
             </a:r>
             <a:r>
               <a:rPr lang="en-US" sz="1400" dirty="0">

</xml_diff>